<commit_message>
Atualiza projetos para permitir gerar curso null
</commit_message>
<xml_diff>
--- a/programacao-funcional-java8.pptx
+++ b/programacao-funcional-java8.pptx
@@ -216,7 +216,7 @@
           <a:p>
             <a:fld id="{7497B6E1-7C5B-524D-B5EB-5E6695205380}" type="datetimeFigureOut">
               <a:rPr lang="pt-BR" smtClean="0"/>
-              <a:t>18/09/2019</a:t>
+              <a:t>19/09/2019</a:t>
             </a:fld>
             <a:endParaRPr lang="pt-BR"/>
           </a:p>
@@ -654,7 +654,7 @@
           <a:p>
             <a:fld id="{19E7D63B-43B5-8A4C-BD12-76889BE136BD}" type="datetime1">
               <a:rPr lang="en-US" smtClean="0"/>
-              <a:t>9/18/19</a:t>
+              <a:t>9/19/19</a:t>
             </a:fld>
             <a:endParaRPr lang="en-US" dirty="0"/>
           </a:p>
@@ -921,7 +921,7 @@
           <a:p>
             <a:fld id="{124E9894-F119-A64C-B7CB-D7CE860A73BE}" type="datetime1">
               <a:rPr lang="en-US" smtClean="0"/>
-              <a:t>9/18/19</a:t>
+              <a:t>9/19/19</a:t>
             </a:fld>
             <a:endParaRPr lang="en-US" dirty="0"/>
           </a:p>
@@ -1153,7 +1153,7 @@
           <a:p>
             <a:fld id="{124E9894-F119-A64C-B7CB-D7CE860A73BE}" type="datetime1">
               <a:rPr lang="en-US" smtClean="0"/>
-              <a:t>9/18/19</a:t>
+              <a:t>9/19/19</a:t>
             </a:fld>
             <a:endParaRPr lang="en-US" dirty="0"/>
           </a:p>
@@ -1464,7 +1464,7 @@
           <a:p>
             <a:fld id="{124E9894-F119-A64C-B7CB-D7CE860A73BE}" type="datetime1">
               <a:rPr lang="en-US" smtClean="0"/>
-              <a:t>9/18/19</a:t>
+              <a:t>9/19/19</a:t>
             </a:fld>
             <a:endParaRPr lang="en-US" dirty="0"/>
           </a:p>
@@ -1938,7 +1938,7 @@
           <a:p>
             <a:fld id="{B4BBB50B-BAA3-9748-978F-08A7877AB7D9}" type="datetime1">
               <a:rPr lang="en-US" smtClean="0"/>
-              <a:t>9/18/19</a:t>
+              <a:t>9/19/19</a:t>
             </a:fld>
             <a:endParaRPr lang="en-US" dirty="0"/>
           </a:p>
@@ -2485,7 +2485,7 @@
           <a:p>
             <a:fld id="{124E9894-F119-A64C-B7CB-D7CE860A73BE}" type="datetime1">
               <a:rPr lang="en-US" smtClean="0"/>
-              <a:t>9/18/19</a:t>
+              <a:t>9/19/19</a:t>
             </a:fld>
             <a:endParaRPr lang="en-US" dirty="0"/>
           </a:p>
@@ -3260,7 +3260,7 @@
           <a:p>
             <a:fld id="{124E9894-F119-A64C-B7CB-D7CE860A73BE}" type="datetime1">
               <a:rPr lang="en-US" smtClean="0"/>
-              <a:t>9/18/19</a:t>
+              <a:t>9/19/19</a:t>
             </a:fld>
             <a:endParaRPr lang="en-US" dirty="0"/>
           </a:p>
@@ -3436,7 +3436,7 @@
           <a:p>
             <a:fld id="{45040DEA-CE02-EF42-8F10-34F709D8505D}" type="datetime1">
               <a:rPr lang="en-US" smtClean="0"/>
-              <a:t>9/18/19</a:t>
+              <a:t>9/19/19</a:t>
             </a:fld>
             <a:endParaRPr lang="en-US" dirty="0"/>
           </a:p>
@@ -3659,7 +3659,7 @@
           <a:p>
             <a:fld id="{A0C1C801-5706-434E-AB65-DDFBCF1F55D2}" type="datetime1">
               <a:rPr lang="en-US" smtClean="0"/>
-              <a:t>9/18/19</a:t>
+              <a:t>9/19/19</a:t>
             </a:fld>
             <a:endParaRPr lang="en-US" dirty="0"/>
           </a:p>
@@ -3839,7 +3839,7 @@
           <a:p>
             <a:fld id="{39AE0FD8-7D7B-EA4F-8AF8-8B97820A0C5D}" type="datetime1">
               <a:rPr lang="en-US" smtClean="0"/>
-              <a:t>9/18/19</a:t>
+              <a:t>9/19/19</a:t>
             </a:fld>
             <a:endParaRPr lang="en-US" dirty="0"/>
           </a:p>
@@ -4128,7 +4128,7 @@
           <a:p>
             <a:fld id="{7FC94D43-3F68-DC43-8EF0-95FB3D51CCCF}" type="datetime1">
               <a:rPr lang="en-US" smtClean="0"/>
-              <a:t>9/18/19</a:t>
+              <a:t>9/19/19</a:t>
             </a:fld>
             <a:endParaRPr lang="en-US" dirty="0"/>
           </a:p>
@@ -4370,7 +4370,7 @@
           <a:p>
             <a:fld id="{BD42CFC2-1CE8-9045-8C9C-0F183F0FB455}" type="datetime1">
               <a:rPr lang="en-US" smtClean="0"/>
-              <a:t>9/18/19</a:t>
+              <a:t>9/19/19</a:t>
             </a:fld>
             <a:endParaRPr lang="en-US" dirty="0"/>
           </a:p>
@@ -4749,7 +4749,7 @@
           <a:p>
             <a:fld id="{F1B5C6E2-D044-C748-9C41-86C9B2F84EB9}" type="datetime1">
               <a:rPr lang="en-US" smtClean="0"/>
-              <a:t>9/18/19</a:t>
+              <a:t>9/19/19</a:t>
             </a:fld>
             <a:endParaRPr lang="en-US" dirty="0"/>
           </a:p>
@@ -4867,7 +4867,7 @@
           <a:p>
             <a:fld id="{359C32BA-C166-AC45-9FCD-8BF0F43629D9}" type="datetime1">
               <a:rPr lang="en-US" smtClean="0"/>
-              <a:t>9/18/19</a:t>
+              <a:t>9/19/19</a:t>
             </a:fld>
             <a:endParaRPr lang="en-US" dirty="0"/>
           </a:p>
@@ -4962,7 +4962,7 @@
           <a:p>
             <a:fld id="{E5D0D591-4B92-A44B-A0EA-798E76AD0368}" type="datetime1">
               <a:rPr lang="en-US" smtClean="0"/>
-              <a:t>9/18/19</a:t>
+              <a:t>9/19/19</a:t>
             </a:fld>
             <a:endParaRPr lang="en-US" dirty="0"/>
           </a:p>
@@ -5211,7 +5211,7 @@
           <a:p>
             <a:fld id="{8201F472-E17F-4B47-A44B-A2249FA27ED2}" type="datetime1">
               <a:rPr lang="en-US" smtClean="0"/>
-              <a:t>9/18/19</a:t>
+              <a:t>9/19/19</a:t>
             </a:fld>
             <a:endParaRPr lang="en-US" dirty="0"/>
           </a:p>
@@ -5468,7 +5468,7 @@
           <a:p>
             <a:fld id="{8BEFB9EE-CDF2-6F49-80F4-278D1604F10C}" type="datetime1">
               <a:rPr lang="en-US" smtClean="0"/>
-              <a:t>9/18/19</a:t>
+              <a:t>9/19/19</a:t>
             </a:fld>
             <a:endParaRPr lang="en-US" dirty="0"/>
           </a:p>
@@ -5714,7 +5714,7 @@
           <a:p>
             <a:fld id="{124E9894-F119-A64C-B7CB-D7CE860A73BE}" type="datetime1">
               <a:rPr lang="en-US" smtClean="0"/>
-              <a:t>9/18/19</a:t>
+              <a:t>9/19/19</a:t>
             </a:fld>
             <a:endParaRPr lang="en-US" dirty="0"/>
           </a:p>
@@ -7443,11 +7443,17 @@
             <p:ph type="title"/>
           </p:nvPr>
         </p:nvSpPr>
-        <p:spPr/>
+        <p:spPr>
+          <a:xfrm>
+            <a:off x="685800" y="764373"/>
+            <a:ext cx="10820400" cy="1293028"/>
+          </a:xfrm>
+        </p:spPr>
         <p:txBody>
           <a:bodyPr/>
           <a:lstStyle/>
           <a:p>
+            <a:pPr algn="ctr"/>
             <a:r>
               <a:rPr lang="pt-BR" dirty="0"/>
               <a:t>tópicos</a:t>
@@ -7476,9 +7482,13 @@
           <a:bodyPr/>
           <a:lstStyle/>
           <a:p>
+            <a:pPr marL="457200" indent="-457200">
+              <a:buFont typeface="+mj-lt"/>
+              <a:buAutoNum type="arabicPeriod"/>
+            </a:pPr>
             <a:r>
               <a:rPr lang="pt-BR" dirty="0" err="1"/>
-              <a:t>Streams</a:t>
+              <a:t>Stream</a:t>
             </a:r>
             <a:r>
               <a:rPr lang="pt-BR" dirty="0"/>
@@ -7490,11 +7500,11 @@
             </a:r>
             <a:r>
               <a:rPr lang="pt-BR" dirty="0"/>
-              <a:t> (as variações </a:t>
+              <a:t> (</a:t>
             </a:r>
             <a:r>
               <a:rPr lang="pt-BR" dirty="0" err="1"/>
-              <a:t>toInt</a:t>
+              <a:t>mapToInt</a:t>
             </a:r>
             <a:r>
               <a:rPr lang="pt-BR" dirty="0"/>
@@ -7502,22 +7512,51 @@
             </a:r>
             <a:r>
               <a:rPr lang="pt-BR" dirty="0" err="1"/>
-              <a:t>toLong</a:t>
+              <a:t>mapToDouble</a:t>
             </a:r>
             <a:r>
               <a:rPr lang="pt-BR" dirty="0"/>
-              <a:t>, </a:t>
-            </a:r>
+              <a:t>...): média das notas de usuários, maior nota</a:t>
+            </a:r>
+          </a:p>
+          <a:p>
+            <a:pPr marL="457200" indent="-457200">
+              <a:buFont typeface="+mj-lt"/>
+              <a:buAutoNum type="arabicPeriod"/>
+            </a:pPr>
             <a:r>
               <a:rPr lang="pt-BR" dirty="0" err="1"/>
-              <a:t>toDouble</a:t>
+              <a:t>Filter</a:t>
             </a:r>
             <a:r>
               <a:rPr lang="pt-BR" dirty="0"/>
-              <a:t>)</a:t>
-            </a:r>
-          </a:p>
-          <a:p>
+              <a:t>: </a:t>
+            </a:r>
+            <a:r>
+              <a:rPr lang="pt-BR"/>
+              <a:t>filtrar alunos por sexo</a:t>
+            </a:r>
+            <a:endParaRPr lang="pt-BR" dirty="0"/>
+          </a:p>
+          <a:p>
+            <a:pPr marL="457200" indent="-457200">
+              <a:buFont typeface="+mj-lt"/>
+              <a:buAutoNum type="arabicPeriod"/>
+            </a:pPr>
+            <a:r>
+              <a:rPr lang="pt-BR" dirty="0" err="1"/>
+              <a:t>Filter</a:t>
+            </a:r>
+            <a:r>
+              <a:rPr lang="pt-BR" dirty="0"/>
+              <a:t>: obter o curso do aluno e contar quantos estão matriculados em um curso</a:t>
+            </a:r>
+          </a:p>
+          <a:p>
+            <a:pPr marL="457200" indent="-457200">
+              <a:buFont typeface="+mj-lt"/>
+              <a:buAutoNum type="arabicPeriod"/>
+            </a:pPr>
             <a:r>
               <a:rPr lang="pt-BR" dirty="0" err="1"/>
               <a:t>Map</a:t>
@@ -7530,9 +7569,24 @@
               <a:rPr lang="pt-BR" dirty="0" err="1"/>
               <a:t>collect</a:t>
             </a:r>
-            <a:endParaRPr lang="pt-BR" dirty="0"/>
-          </a:p>
-          <a:p>
+            <a:r>
+              <a:rPr lang="pt-BR" dirty="0"/>
+              <a:t>: </a:t>
+            </a:r>
+            <a:r>
+              <a:rPr lang="pt-BR" dirty="0" err="1"/>
+              <a:t>Collectors.toList</a:t>
+            </a:r>
+            <a:r>
+              <a:rPr lang="pt-BR" dirty="0"/>
+              <a:t>()</a:t>
+            </a:r>
+          </a:p>
+          <a:p>
+            <a:pPr marL="457200" indent="-457200">
+              <a:buFont typeface="+mj-lt"/>
+              <a:buAutoNum type="arabicPeriod"/>
+            </a:pPr>
             <a:r>
               <a:rPr lang="pt-BR" dirty="0"/>
               <a:t>Várias operações </a:t>
@@ -7544,6 +7598,10 @@
             <a:endParaRPr lang="pt-BR" dirty="0"/>
           </a:p>
           <a:p>
+            <a:pPr marL="457200" indent="-457200">
+              <a:buFont typeface="+mj-lt"/>
+              <a:buAutoNum type="arabicPeriod"/>
+            </a:pPr>
             <a:r>
               <a:rPr lang="pt-BR" dirty="0"/>
               <a:t>Mostrar relação das entradas e saídas do </a:t>
@@ -7563,19 +7621,20 @@
             <a:endParaRPr lang="pt-BR" dirty="0"/>
           </a:p>
           <a:p>
-            <a:r>
-              <a:rPr lang="pt-BR" dirty="0" err="1"/>
-              <a:t>Filter</a:t>
-            </a:r>
-            <a:endParaRPr lang="pt-BR" dirty="0"/>
-          </a:p>
-          <a:p>
+            <a:pPr marL="457200" indent="-457200">
+              <a:buFont typeface="+mj-lt"/>
+              <a:buAutoNum type="arabicPeriod"/>
+            </a:pPr>
             <a:r>
               <a:rPr lang="pt-BR" dirty="0"/>
               <a:t>Expressões Lambda</a:t>
             </a:r>
           </a:p>
           <a:p>
+            <a:pPr marL="457200" indent="-457200">
+              <a:buFont typeface="+mj-lt"/>
+              <a:buAutoNum type="arabicPeriod"/>
+            </a:pPr>
             <a:r>
               <a:rPr lang="pt-BR" dirty="0" err="1"/>
               <a:t>Method</a:t>
@@ -7631,6 +7690,527 @@
   <p:clrMapOvr>
     <a:masterClrMapping/>
   </p:clrMapOvr>
+  <p:timing>
+    <p:tnLst>
+      <p:par>
+        <p:cTn id="1" dur="indefinite" restart="never" nodeType="tmRoot">
+          <p:childTnLst>
+            <p:seq concurrent="1" nextAc="seek">
+              <p:cTn id="2" dur="indefinite" nodeType="mainSeq">
+                <p:childTnLst>
+                  <p:par>
+                    <p:cTn id="3" fill="hold">
+                      <p:stCondLst>
+                        <p:cond delay="indefinite"/>
+                      </p:stCondLst>
+                      <p:childTnLst>
+                        <p:par>
+                          <p:cTn id="4" fill="hold">
+                            <p:stCondLst>
+                              <p:cond delay="0"/>
+                            </p:stCondLst>
+                            <p:childTnLst>
+                              <p:par>
+                                <p:cTn id="5" presetID="9" presetClass="entr" presetSubtype="0" fill="hold" grpId="0" nodeType="clickEffect">
+                                  <p:stCondLst>
+                                    <p:cond delay="0"/>
+                                  </p:stCondLst>
+                                  <p:childTnLst>
+                                    <p:set>
+                                      <p:cBhvr>
+                                        <p:cTn id="6" dur="1" fill="hold">
+                                          <p:stCondLst>
+                                            <p:cond delay="0"/>
+                                          </p:stCondLst>
+                                        </p:cTn>
+                                        <p:tgtEl>
+                                          <p:spTgt spid="3">
+                                            <p:txEl>
+                                              <p:pRg st="0" end="0"/>
+                                            </p:txEl>
+                                          </p:spTgt>
+                                        </p:tgtEl>
+                                        <p:attrNameLst>
+                                          <p:attrName>style.visibility</p:attrName>
+                                        </p:attrNameLst>
+                                      </p:cBhvr>
+                                      <p:to>
+                                        <p:strVal val="visible"/>
+                                      </p:to>
+                                    </p:set>
+                                    <p:animEffect transition="in" filter="dissolve">
+                                      <p:cBhvr>
+                                        <p:cTn id="7" dur="500"/>
+                                        <p:tgtEl>
+                                          <p:spTgt spid="3">
+                                            <p:txEl>
+                                              <p:pRg st="0" end="0"/>
+                                            </p:txEl>
+                                          </p:spTgt>
+                                        </p:tgtEl>
+                                      </p:cBhvr>
+                                    </p:animEffect>
+                                  </p:childTnLst>
+                                </p:cTn>
+                              </p:par>
+                            </p:childTnLst>
+                          </p:cTn>
+                        </p:par>
+                      </p:childTnLst>
+                    </p:cTn>
+                  </p:par>
+                  <p:par>
+                    <p:cTn id="8" fill="hold">
+                      <p:stCondLst>
+                        <p:cond delay="indefinite"/>
+                      </p:stCondLst>
+                      <p:childTnLst>
+                        <p:par>
+                          <p:cTn id="9" fill="hold">
+                            <p:stCondLst>
+                              <p:cond delay="0"/>
+                            </p:stCondLst>
+                            <p:childTnLst>
+                              <p:par>
+                                <p:cTn id="10" presetID="9" presetClass="entr" presetSubtype="0" fill="hold" grpId="0" nodeType="clickEffect">
+                                  <p:stCondLst>
+                                    <p:cond delay="0"/>
+                                  </p:stCondLst>
+                                  <p:childTnLst>
+                                    <p:set>
+                                      <p:cBhvr>
+                                        <p:cTn id="11" dur="1" fill="hold">
+                                          <p:stCondLst>
+                                            <p:cond delay="0"/>
+                                          </p:stCondLst>
+                                        </p:cTn>
+                                        <p:tgtEl>
+                                          <p:spTgt spid="3">
+                                            <p:txEl>
+                                              <p:pRg st="1" end="1"/>
+                                            </p:txEl>
+                                          </p:spTgt>
+                                        </p:tgtEl>
+                                        <p:attrNameLst>
+                                          <p:attrName>style.visibility</p:attrName>
+                                        </p:attrNameLst>
+                                      </p:cBhvr>
+                                      <p:to>
+                                        <p:strVal val="visible"/>
+                                      </p:to>
+                                    </p:set>
+                                    <p:animEffect transition="in" filter="dissolve">
+                                      <p:cBhvr>
+                                        <p:cTn id="12" dur="500"/>
+                                        <p:tgtEl>
+                                          <p:spTgt spid="3">
+                                            <p:txEl>
+                                              <p:pRg st="1" end="1"/>
+                                            </p:txEl>
+                                          </p:spTgt>
+                                        </p:tgtEl>
+                                      </p:cBhvr>
+                                    </p:animEffect>
+                                  </p:childTnLst>
+                                </p:cTn>
+                              </p:par>
+                            </p:childTnLst>
+                          </p:cTn>
+                        </p:par>
+                      </p:childTnLst>
+                    </p:cTn>
+                  </p:par>
+                  <p:par>
+                    <p:cTn id="13" fill="hold">
+                      <p:stCondLst>
+                        <p:cond delay="indefinite"/>
+                      </p:stCondLst>
+                      <p:childTnLst>
+                        <p:par>
+                          <p:cTn id="14" fill="hold">
+                            <p:stCondLst>
+                              <p:cond delay="0"/>
+                            </p:stCondLst>
+                            <p:childTnLst>
+                              <p:par>
+                                <p:cTn id="15" presetID="9" presetClass="entr" presetSubtype="0" fill="hold" grpId="0" nodeType="clickEffect">
+                                  <p:stCondLst>
+                                    <p:cond delay="0"/>
+                                  </p:stCondLst>
+                                  <p:childTnLst>
+                                    <p:set>
+                                      <p:cBhvr>
+                                        <p:cTn id="16" dur="1" fill="hold">
+                                          <p:stCondLst>
+                                            <p:cond delay="0"/>
+                                          </p:stCondLst>
+                                        </p:cTn>
+                                        <p:tgtEl>
+                                          <p:spTgt spid="3">
+                                            <p:txEl>
+                                              <p:pRg st="2" end="2"/>
+                                            </p:txEl>
+                                          </p:spTgt>
+                                        </p:tgtEl>
+                                        <p:attrNameLst>
+                                          <p:attrName>style.visibility</p:attrName>
+                                        </p:attrNameLst>
+                                      </p:cBhvr>
+                                      <p:to>
+                                        <p:strVal val="visible"/>
+                                      </p:to>
+                                    </p:set>
+                                    <p:animEffect transition="in" filter="dissolve">
+                                      <p:cBhvr>
+                                        <p:cTn id="17" dur="500"/>
+                                        <p:tgtEl>
+                                          <p:spTgt spid="3">
+                                            <p:txEl>
+                                              <p:pRg st="2" end="2"/>
+                                            </p:txEl>
+                                          </p:spTgt>
+                                        </p:tgtEl>
+                                      </p:cBhvr>
+                                    </p:animEffect>
+                                  </p:childTnLst>
+                                </p:cTn>
+                              </p:par>
+                            </p:childTnLst>
+                          </p:cTn>
+                        </p:par>
+                      </p:childTnLst>
+                    </p:cTn>
+                  </p:par>
+                  <p:par>
+                    <p:cTn id="18" fill="hold">
+                      <p:stCondLst>
+                        <p:cond delay="indefinite"/>
+                      </p:stCondLst>
+                      <p:childTnLst>
+                        <p:par>
+                          <p:cTn id="19" fill="hold">
+                            <p:stCondLst>
+                              <p:cond delay="0"/>
+                            </p:stCondLst>
+                            <p:childTnLst>
+                              <p:par>
+                                <p:cTn id="20" presetID="9" presetClass="entr" presetSubtype="0" fill="hold" grpId="0" nodeType="clickEffect">
+                                  <p:stCondLst>
+                                    <p:cond delay="0"/>
+                                  </p:stCondLst>
+                                  <p:childTnLst>
+                                    <p:set>
+                                      <p:cBhvr>
+                                        <p:cTn id="21" dur="1" fill="hold">
+                                          <p:stCondLst>
+                                            <p:cond delay="0"/>
+                                          </p:stCondLst>
+                                        </p:cTn>
+                                        <p:tgtEl>
+                                          <p:spTgt spid="3">
+                                            <p:txEl>
+                                              <p:pRg st="3" end="3"/>
+                                            </p:txEl>
+                                          </p:spTgt>
+                                        </p:tgtEl>
+                                        <p:attrNameLst>
+                                          <p:attrName>style.visibility</p:attrName>
+                                        </p:attrNameLst>
+                                      </p:cBhvr>
+                                      <p:to>
+                                        <p:strVal val="visible"/>
+                                      </p:to>
+                                    </p:set>
+                                    <p:animEffect transition="in" filter="dissolve">
+                                      <p:cBhvr>
+                                        <p:cTn id="22" dur="500"/>
+                                        <p:tgtEl>
+                                          <p:spTgt spid="3">
+                                            <p:txEl>
+                                              <p:pRg st="3" end="3"/>
+                                            </p:txEl>
+                                          </p:spTgt>
+                                        </p:tgtEl>
+                                      </p:cBhvr>
+                                    </p:animEffect>
+                                  </p:childTnLst>
+                                </p:cTn>
+                              </p:par>
+                            </p:childTnLst>
+                          </p:cTn>
+                        </p:par>
+                      </p:childTnLst>
+                    </p:cTn>
+                  </p:par>
+                  <p:par>
+                    <p:cTn id="23" fill="hold">
+                      <p:stCondLst>
+                        <p:cond delay="indefinite"/>
+                      </p:stCondLst>
+                      <p:childTnLst>
+                        <p:par>
+                          <p:cTn id="24" fill="hold">
+                            <p:stCondLst>
+                              <p:cond delay="0"/>
+                            </p:stCondLst>
+                            <p:childTnLst>
+                              <p:par>
+                                <p:cTn id="25" presetID="9" presetClass="entr" presetSubtype="0" fill="hold" grpId="0" nodeType="clickEffect">
+                                  <p:stCondLst>
+                                    <p:cond delay="0"/>
+                                  </p:stCondLst>
+                                  <p:childTnLst>
+                                    <p:set>
+                                      <p:cBhvr>
+                                        <p:cTn id="26" dur="1" fill="hold">
+                                          <p:stCondLst>
+                                            <p:cond delay="0"/>
+                                          </p:stCondLst>
+                                        </p:cTn>
+                                        <p:tgtEl>
+                                          <p:spTgt spid="3">
+                                            <p:txEl>
+                                              <p:pRg st="4" end="4"/>
+                                            </p:txEl>
+                                          </p:spTgt>
+                                        </p:tgtEl>
+                                        <p:attrNameLst>
+                                          <p:attrName>style.visibility</p:attrName>
+                                        </p:attrNameLst>
+                                      </p:cBhvr>
+                                      <p:to>
+                                        <p:strVal val="visible"/>
+                                      </p:to>
+                                    </p:set>
+                                    <p:animEffect transition="in" filter="dissolve">
+                                      <p:cBhvr>
+                                        <p:cTn id="27" dur="500"/>
+                                        <p:tgtEl>
+                                          <p:spTgt spid="3">
+                                            <p:txEl>
+                                              <p:pRg st="4" end="4"/>
+                                            </p:txEl>
+                                          </p:spTgt>
+                                        </p:tgtEl>
+                                      </p:cBhvr>
+                                    </p:animEffect>
+                                  </p:childTnLst>
+                                </p:cTn>
+                              </p:par>
+                            </p:childTnLst>
+                          </p:cTn>
+                        </p:par>
+                      </p:childTnLst>
+                    </p:cTn>
+                  </p:par>
+                  <p:par>
+                    <p:cTn id="28" fill="hold">
+                      <p:stCondLst>
+                        <p:cond delay="indefinite"/>
+                      </p:stCondLst>
+                      <p:childTnLst>
+                        <p:par>
+                          <p:cTn id="29" fill="hold">
+                            <p:stCondLst>
+                              <p:cond delay="0"/>
+                            </p:stCondLst>
+                            <p:childTnLst>
+                              <p:par>
+                                <p:cTn id="30" presetID="9" presetClass="entr" presetSubtype="0" fill="hold" grpId="0" nodeType="clickEffect">
+                                  <p:stCondLst>
+                                    <p:cond delay="0"/>
+                                  </p:stCondLst>
+                                  <p:childTnLst>
+                                    <p:set>
+                                      <p:cBhvr>
+                                        <p:cTn id="31" dur="1" fill="hold">
+                                          <p:stCondLst>
+                                            <p:cond delay="0"/>
+                                          </p:stCondLst>
+                                        </p:cTn>
+                                        <p:tgtEl>
+                                          <p:spTgt spid="3">
+                                            <p:txEl>
+                                              <p:pRg st="5" end="5"/>
+                                            </p:txEl>
+                                          </p:spTgt>
+                                        </p:tgtEl>
+                                        <p:attrNameLst>
+                                          <p:attrName>style.visibility</p:attrName>
+                                        </p:attrNameLst>
+                                      </p:cBhvr>
+                                      <p:to>
+                                        <p:strVal val="visible"/>
+                                      </p:to>
+                                    </p:set>
+                                    <p:animEffect transition="in" filter="dissolve">
+                                      <p:cBhvr>
+                                        <p:cTn id="32" dur="500"/>
+                                        <p:tgtEl>
+                                          <p:spTgt spid="3">
+                                            <p:txEl>
+                                              <p:pRg st="5" end="5"/>
+                                            </p:txEl>
+                                          </p:spTgt>
+                                        </p:tgtEl>
+                                      </p:cBhvr>
+                                    </p:animEffect>
+                                  </p:childTnLst>
+                                </p:cTn>
+                              </p:par>
+                            </p:childTnLst>
+                          </p:cTn>
+                        </p:par>
+                      </p:childTnLst>
+                    </p:cTn>
+                  </p:par>
+                  <p:par>
+                    <p:cTn id="33" fill="hold">
+                      <p:stCondLst>
+                        <p:cond delay="indefinite"/>
+                      </p:stCondLst>
+                      <p:childTnLst>
+                        <p:par>
+                          <p:cTn id="34" fill="hold">
+                            <p:stCondLst>
+                              <p:cond delay="0"/>
+                            </p:stCondLst>
+                            <p:childTnLst>
+                              <p:par>
+                                <p:cTn id="35" presetID="9" presetClass="entr" presetSubtype="0" fill="hold" grpId="0" nodeType="clickEffect">
+                                  <p:stCondLst>
+                                    <p:cond delay="0"/>
+                                  </p:stCondLst>
+                                  <p:childTnLst>
+                                    <p:set>
+                                      <p:cBhvr>
+                                        <p:cTn id="36" dur="1" fill="hold">
+                                          <p:stCondLst>
+                                            <p:cond delay="0"/>
+                                          </p:stCondLst>
+                                        </p:cTn>
+                                        <p:tgtEl>
+                                          <p:spTgt spid="3">
+                                            <p:txEl>
+                                              <p:pRg st="6" end="6"/>
+                                            </p:txEl>
+                                          </p:spTgt>
+                                        </p:tgtEl>
+                                        <p:attrNameLst>
+                                          <p:attrName>style.visibility</p:attrName>
+                                        </p:attrNameLst>
+                                      </p:cBhvr>
+                                      <p:to>
+                                        <p:strVal val="visible"/>
+                                      </p:to>
+                                    </p:set>
+                                    <p:animEffect transition="in" filter="dissolve">
+                                      <p:cBhvr>
+                                        <p:cTn id="37" dur="500"/>
+                                        <p:tgtEl>
+                                          <p:spTgt spid="3">
+                                            <p:txEl>
+                                              <p:pRg st="6" end="6"/>
+                                            </p:txEl>
+                                          </p:spTgt>
+                                        </p:tgtEl>
+                                      </p:cBhvr>
+                                    </p:animEffect>
+                                  </p:childTnLst>
+                                </p:cTn>
+                              </p:par>
+                            </p:childTnLst>
+                          </p:cTn>
+                        </p:par>
+                      </p:childTnLst>
+                    </p:cTn>
+                  </p:par>
+                  <p:par>
+                    <p:cTn id="38" fill="hold">
+                      <p:stCondLst>
+                        <p:cond delay="indefinite"/>
+                      </p:stCondLst>
+                      <p:childTnLst>
+                        <p:par>
+                          <p:cTn id="39" fill="hold">
+                            <p:stCondLst>
+                              <p:cond delay="0"/>
+                            </p:stCondLst>
+                            <p:childTnLst>
+                              <p:par>
+                                <p:cTn id="40" presetID="9" presetClass="entr" presetSubtype="0" fill="hold" grpId="0" nodeType="clickEffect">
+                                  <p:stCondLst>
+                                    <p:cond delay="0"/>
+                                  </p:stCondLst>
+                                  <p:childTnLst>
+                                    <p:set>
+                                      <p:cBhvr>
+                                        <p:cTn id="41" dur="1" fill="hold">
+                                          <p:stCondLst>
+                                            <p:cond delay="0"/>
+                                          </p:stCondLst>
+                                        </p:cTn>
+                                        <p:tgtEl>
+                                          <p:spTgt spid="3">
+                                            <p:txEl>
+                                              <p:pRg st="7" end="7"/>
+                                            </p:txEl>
+                                          </p:spTgt>
+                                        </p:tgtEl>
+                                        <p:attrNameLst>
+                                          <p:attrName>style.visibility</p:attrName>
+                                        </p:attrNameLst>
+                                      </p:cBhvr>
+                                      <p:to>
+                                        <p:strVal val="visible"/>
+                                      </p:to>
+                                    </p:set>
+                                    <p:animEffect transition="in" filter="dissolve">
+                                      <p:cBhvr>
+                                        <p:cTn id="42" dur="500"/>
+                                        <p:tgtEl>
+                                          <p:spTgt spid="3">
+                                            <p:txEl>
+                                              <p:pRg st="7" end="7"/>
+                                            </p:txEl>
+                                          </p:spTgt>
+                                        </p:tgtEl>
+                                      </p:cBhvr>
+                                    </p:animEffect>
+                                  </p:childTnLst>
+                                </p:cTn>
+                              </p:par>
+                            </p:childTnLst>
+                          </p:cTn>
+                        </p:par>
+                      </p:childTnLst>
+                    </p:cTn>
+                  </p:par>
+                </p:childTnLst>
+              </p:cTn>
+              <p:prevCondLst>
+                <p:cond evt="onPrev" delay="0">
+                  <p:tgtEl>
+                    <p:sldTgt/>
+                  </p:tgtEl>
+                </p:cond>
+              </p:prevCondLst>
+              <p:nextCondLst>
+                <p:cond evt="onNext" delay="0">
+                  <p:tgtEl>
+                    <p:sldTgt/>
+                  </p:tgtEl>
+                </p:cond>
+              </p:nextCondLst>
+            </p:seq>
+          </p:childTnLst>
+        </p:cTn>
+      </p:par>
+    </p:tnLst>
+    <p:bldLst>
+      <p:bldP spid="3" grpId="0" build="p"/>
+    </p:bldLst>
+  </p:timing>
 </p:sld>
 </file>
 
@@ -9581,8 +10161,22 @@
 </file>
 
 <file path=ppt/slides/slide20.xml><?xml version="1.0" encoding="utf-8"?>
-<p:sld xmlns:a="http://schemas.openxmlformats.org/drawingml/2006/main" xmlns:r="http://schemas.openxmlformats.org/officeDocument/2006/relationships" xmlns:p="http://schemas.openxmlformats.org/presentationml/2006/main">
+<p:sld xmlns:a="http://schemas.openxmlformats.org/drawingml/2006/main" xmlns:r="http://schemas.openxmlformats.org/officeDocument/2006/relationships" xmlns:p="http://schemas.openxmlformats.org/presentationml/2006/main" showMasterSp="0">
   <p:cSld>
+    <p:bg>
+      <p:bgPr>
+        <a:blipFill dpi="0" rotWithShape="1">
+          <a:blip r:embed="rId2">
+            <a:lum/>
+          </a:blip>
+          <a:srcRect/>
+          <a:stretch>
+            <a:fillRect t="-6000" b="-6000"/>
+          </a:stretch>
+        </a:blipFill>
+        <a:effectLst/>
+      </p:bgPr>
+    </p:bg>
     <p:spTree>
       <p:nvGrpSpPr>
         <p:cNvPr id="1" name=""/>
@@ -9597,40 +10191,6 @@
           <a:chExt cx="0" cy="0"/>
         </a:xfrm>
       </p:grpSpPr>
-      <p:sp>
-        <p:nvSpPr>
-          <p:cNvPr id="2" name="Title 1">
-            <a:extLst>
-              <a:ext uri="{FF2B5EF4-FFF2-40B4-BE49-F238E27FC236}">
-                <a16:creationId xmlns:a16="http://schemas.microsoft.com/office/drawing/2014/main" id="{E830B414-47E6-3B45-8FB1-EF815CB0CE9F}"/>
-              </a:ext>
-            </a:extLst>
-          </p:cNvPr>
-          <p:cNvSpPr>
-            <a:spLocks noGrp="1"/>
-          </p:cNvSpPr>
-          <p:nvPr>
-            <p:ph type="title"/>
-          </p:nvPr>
-        </p:nvSpPr>
-        <p:spPr>
-          <a:xfrm>
-            <a:off x="1921239" y="2967927"/>
-            <a:ext cx="8610600" cy="1293028"/>
-          </a:xfrm>
-        </p:spPr>
-        <p:txBody>
-          <a:bodyPr/>
-          <a:lstStyle/>
-          <a:p>
-            <a:pPr algn="ctr"/>
-            <a:r>
-              <a:rPr lang="pt-BR" dirty="0"/>
-              <a:t>obrigado</a:t>
-            </a:r>
-          </a:p>
-        </p:txBody>
-      </p:sp>
       <p:sp>
         <p:nvSpPr>
           <p:cNvPr id="4" name="Slide Number Placeholder 3">

</xml_diff>

<commit_message>
Atualiza slides e README
</commit_message>
<xml_diff>
--- a/programacao-funcional-java8.pptx
+++ b/programacao-funcional-java8.pptx
@@ -216,7 +216,7 @@
           <a:p>
             <a:fld id="{7497B6E1-7C5B-524D-B5EB-5E6695205380}" type="datetimeFigureOut">
               <a:rPr lang="pt-BR" smtClean="0"/>
-              <a:t>09/10/2019</a:t>
+              <a:t>10/06/2020</a:t>
             </a:fld>
             <a:endParaRPr lang="pt-BR"/>
           </a:p>
@@ -654,7 +654,7 @@
           <a:p>
             <a:fld id="{19E7D63B-43B5-8A4C-BD12-76889BE136BD}" type="datetime1">
               <a:rPr lang="en-US" smtClean="0"/>
-              <a:t>10/9/19</a:t>
+              <a:t>6/10/20</a:t>
             </a:fld>
             <a:endParaRPr lang="en-US" dirty="0"/>
           </a:p>
@@ -921,7 +921,7 @@
           <a:p>
             <a:fld id="{124E9894-F119-A64C-B7CB-D7CE860A73BE}" type="datetime1">
               <a:rPr lang="en-US" smtClean="0"/>
-              <a:t>10/9/19</a:t>
+              <a:t>6/10/20</a:t>
             </a:fld>
             <a:endParaRPr lang="en-US" dirty="0"/>
           </a:p>
@@ -1153,7 +1153,7 @@
           <a:p>
             <a:fld id="{124E9894-F119-A64C-B7CB-D7CE860A73BE}" type="datetime1">
               <a:rPr lang="en-US" smtClean="0"/>
-              <a:t>10/9/19</a:t>
+              <a:t>6/10/20</a:t>
             </a:fld>
             <a:endParaRPr lang="en-US" dirty="0"/>
           </a:p>
@@ -1464,7 +1464,7 @@
           <a:p>
             <a:fld id="{124E9894-F119-A64C-B7CB-D7CE860A73BE}" type="datetime1">
               <a:rPr lang="en-US" smtClean="0"/>
-              <a:t>10/9/19</a:t>
+              <a:t>6/10/20</a:t>
             </a:fld>
             <a:endParaRPr lang="en-US" dirty="0"/>
           </a:p>
@@ -1938,7 +1938,7 @@
           <a:p>
             <a:fld id="{B4BBB50B-BAA3-9748-978F-08A7877AB7D9}" type="datetime1">
               <a:rPr lang="en-US" smtClean="0"/>
-              <a:t>10/9/19</a:t>
+              <a:t>6/10/20</a:t>
             </a:fld>
             <a:endParaRPr lang="en-US" dirty="0"/>
           </a:p>
@@ -2485,7 +2485,7 @@
           <a:p>
             <a:fld id="{124E9894-F119-A64C-B7CB-D7CE860A73BE}" type="datetime1">
               <a:rPr lang="en-US" smtClean="0"/>
-              <a:t>10/9/19</a:t>
+              <a:t>6/10/20</a:t>
             </a:fld>
             <a:endParaRPr lang="en-US" dirty="0"/>
           </a:p>
@@ -3260,7 +3260,7 @@
           <a:p>
             <a:fld id="{124E9894-F119-A64C-B7CB-D7CE860A73BE}" type="datetime1">
               <a:rPr lang="en-US" smtClean="0"/>
-              <a:t>10/9/19</a:t>
+              <a:t>6/10/20</a:t>
             </a:fld>
             <a:endParaRPr lang="en-US" dirty="0"/>
           </a:p>
@@ -3436,7 +3436,7 @@
           <a:p>
             <a:fld id="{45040DEA-CE02-EF42-8F10-34F709D8505D}" type="datetime1">
               <a:rPr lang="en-US" smtClean="0"/>
-              <a:t>10/9/19</a:t>
+              <a:t>6/10/20</a:t>
             </a:fld>
             <a:endParaRPr lang="en-US" dirty="0"/>
           </a:p>
@@ -3659,7 +3659,7 @@
           <a:p>
             <a:fld id="{A0C1C801-5706-434E-AB65-DDFBCF1F55D2}" type="datetime1">
               <a:rPr lang="en-US" smtClean="0"/>
-              <a:t>10/9/19</a:t>
+              <a:t>6/10/20</a:t>
             </a:fld>
             <a:endParaRPr lang="en-US" dirty="0"/>
           </a:p>
@@ -3839,7 +3839,7 @@
           <a:p>
             <a:fld id="{39AE0FD8-7D7B-EA4F-8AF8-8B97820A0C5D}" type="datetime1">
               <a:rPr lang="en-US" smtClean="0"/>
-              <a:t>10/9/19</a:t>
+              <a:t>6/10/20</a:t>
             </a:fld>
             <a:endParaRPr lang="en-US" dirty="0"/>
           </a:p>
@@ -4128,7 +4128,7 @@
           <a:p>
             <a:fld id="{7FC94D43-3F68-DC43-8EF0-95FB3D51CCCF}" type="datetime1">
               <a:rPr lang="en-US" smtClean="0"/>
-              <a:t>10/9/19</a:t>
+              <a:t>6/10/20</a:t>
             </a:fld>
             <a:endParaRPr lang="en-US" dirty="0"/>
           </a:p>
@@ -4370,7 +4370,7 @@
           <a:p>
             <a:fld id="{BD42CFC2-1CE8-9045-8C9C-0F183F0FB455}" type="datetime1">
               <a:rPr lang="en-US" smtClean="0"/>
-              <a:t>10/9/19</a:t>
+              <a:t>6/10/20</a:t>
             </a:fld>
             <a:endParaRPr lang="en-US" dirty="0"/>
           </a:p>
@@ -4749,7 +4749,7 @@
           <a:p>
             <a:fld id="{F1B5C6E2-D044-C748-9C41-86C9B2F84EB9}" type="datetime1">
               <a:rPr lang="en-US" smtClean="0"/>
-              <a:t>10/9/19</a:t>
+              <a:t>6/10/20</a:t>
             </a:fld>
             <a:endParaRPr lang="en-US" dirty="0"/>
           </a:p>
@@ -4867,7 +4867,7 @@
           <a:p>
             <a:fld id="{359C32BA-C166-AC45-9FCD-8BF0F43629D9}" type="datetime1">
               <a:rPr lang="en-US" smtClean="0"/>
-              <a:t>10/9/19</a:t>
+              <a:t>6/10/20</a:t>
             </a:fld>
             <a:endParaRPr lang="en-US" dirty="0"/>
           </a:p>
@@ -4962,7 +4962,7 @@
           <a:p>
             <a:fld id="{E5D0D591-4B92-A44B-A0EA-798E76AD0368}" type="datetime1">
               <a:rPr lang="en-US" smtClean="0"/>
-              <a:t>10/9/19</a:t>
+              <a:t>6/10/20</a:t>
             </a:fld>
             <a:endParaRPr lang="en-US" dirty="0"/>
           </a:p>
@@ -5211,7 +5211,7 @@
           <a:p>
             <a:fld id="{8201F472-E17F-4B47-A44B-A2249FA27ED2}" type="datetime1">
               <a:rPr lang="en-US" smtClean="0"/>
-              <a:t>10/9/19</a:t>
+              <a:t>6/10/20</a:t>
             </a:fld>
             <a:endParaRPr lang="en-US" dirty="0"/>
           </a:p>
@@ -5468,7 +5468,7 @@
           <a:p>
             <a:fld id="{8BEFB9EE-CDF2-6F49-80F4-278D1604F10C}" type="datetime1">
               <a:rPr lang="en-US" smtClean="0"/>
-              <a:t>10/9/19</a:t>
+              <a:t>6/10/20</a:t>
             </a:fld>
             <a:endParaRPr lang="en-US" dirty="0"/>
           </a:p>
@@ -5714,7 +5714,7 @@
           <a:p>
             <a:fld id="{124E9894-F119-A64C-B7CB-D7CE860A73BE}" type="datetime1">
               <a:rPr lang="en-US" smtClean="0"/>
-              <a:t>10/9/19</a:t>
+              <a:t>6/10/20</a:t>
             </a:fld>
             <a:endParaRPr lang="en-US" dirty="0"/>
           </a:p>
@@ -6299,76 +6299,13 @@
               </a:rPr>
             </a:br>
             <a:r>
-              <a:rPr lang="pt-BR" b="1" dirty="0" err="1">
-                <a:solidFill>
-                  <a:schemeClr val="bg1"/>
-                </a:solidFill>
-              </a:rPr>
-              <a:t>http</a:t>
-            </a:r>
-            <a:r>
               <a:rPr lang="pt-BR" b="1" dirty="0">
                 <a:solidFill>
                   <a:schemeClr val="bg1"/>
                 </a:solidFill>
+                <a:hlinkClick r:id="rId3"/>
               </a:rPr>
-              <a:t>://</a:t>
-            </a:r>
-            <a:r>
-              <a:rPr lang="pt-BR" b="1" dirty="0" err="1">
-                <a:solidFill>
-                  <a:schemeClr val="bg1"/>
-                </a:solidFill>
-              </a:rPr>
-              <a:t>github.com</a:t>
-            </a:r>
-            <a:r>
-              <a:rPr lang="pt-BR" b="1" dirty="0">
-                <a:solidFill>
-                  <a:schemeClr val="bg1"/>
-                </a:solidFill>
-              </a:rPr>
-              <a:t>/</a:t>
-            </a:r>
-            <a:r>
-              <a:rPr lang="pt-BR" b="1" dirty="0" err="1">
-                <a:solidFill>
-                  <a:schemeClr val="bg1"/>
-                </a:solidFill>
-              </a:rPr>
-              <a:t>manoelcampos</a:t>
-            </a:r>
-            <a:r>
-              <a:rPr lang="pt-BR" b="1" dirty="0">
-                <a:solidFill>
-                  <a:schemeClr val="bg1"/>
-                </a:solidFill>
-              </a:rPr>
-              <a:t>/</a:t>
-            </a:r>
-            <a:r>
-              <a:rPr lang="pt-BR" b="1" dirty="0" err="1">
-                <a:solidFill>
-                  <a:schemeClr val="bg1"/>
-                </a:solidFill>
-              </a:rPr>
-              <a:t>programacao</a:t>
-            </a:r>
-            <a:r>
-              <a:rPr lang="pt-BR" b="1" dirty="0">
-                <a:solidFill>
-                  <a:schemeClr val="bg1"/>
-                </a:solidFill>
-              </a:rPr>
-              <a:t>-funcional-</a:t>
-            </a:r>
-            <a:r>
-              <a:rPr lang="pt-BR" b="1" dirty="0" err="1">
-                <a:solidFill>
-                  <a:schemeClr val="bg1"/>
-                </a:solidFill>
-              </a:rPr>
-              <a:t>java</a:t>
+              <a:t>http://github.com/manoelcampos/programacao-funcional-java</a:t>
             </a:r>
             <a:r>
               <a:rPr lang="pt-BR" b="1" dirty="0">
@@ -6449,7 +6386,7 @@
             <a:pPr algn="ctr"/>
             <a:r>
               <a:rPr lang="pt-BR" dirty="0"/>
-              <a:t>Ele É apenas um meio para o fim.</a:t>
+              <a:t>Ele É apenas um meio para um fim.</a:t>
             </a:r>
             <a:br>
               <a:rPr lang="pt-BR" dirty="0"/>
@@ -6625,7 +6562,7 @@
           <a:lstStyle/>
           <a:p>
             <a:r>
-              <a:rPr lang="pt-BR" dirty="0"/>
+              <a:rPr lang="pt-BR" b="1" dirty="0"/>
               <a:t>Processando uma lista</a:t>
             </a:r>
           </a:p>
@@ -6656,7 +6593,15 @@
           <a:p>
             <a:r>
               <a:rPr lang="pt-BR" sz="4000" dirty="0"/>
-              <a:t>E se precisarmos obter estatísticas a respeito de alunos em uma lista, como maior nota, menor nota, total por sexo, etc.?</a:t>
+              <a:t>E se precisarmos obter estatísticas a respeito de alunos em uma lista, como maior nota, menor nota, total por sexo, </a:t>
+            </a:r>
+            <a:r>
+              <a:rPr lang="pt-BR" sz="4000" dirty="0" err="1"/>
+              <a:t>etc</a:t>
+            </a:r>
+            <a:r>
+              <a:rPr lang="pt-BR" sz="4000" dirty="0"/>
+              <a:t>?</a:t>
             </a:r>
           </a:p>
         </p:txBody>
@@ -6742,7 +6687,7 @@
           <a:lstStyle/>
           <a:p>
             <a:r>
-              <a:rPr lang="pt-BR" dirty="0"/>
+              <a:rPr lang="pt-BR" b="1" dirty="0"/>
               <a:t>Processando uma lista</a:t>
             </a:r>
           </a:p>
@@ -7040,7 +6985,7 @@
           <a:lstStyle/>
           <a:p>
             <a:r>
-              <a:rPr lang="pt-BR" dirty="0"/>
+              <a:rPr lang="pt-BR" b="1" dirty="0"/>
               <a:t>O que há de errado?</a:t>
             </a:r>
           </a:p>
@@ -8541,7 +8486,7 @@
               <a:buNone/>
             </a:pPr>
             <a:r>
-              <a:rPr lang="pt-BR" sz="4000" dirty="0" err="1"/>
+              <a:rPr lang="pt-BR" sz="4000" b="1" dirty="0" err="1"/>
               <a:t>Consumer</a:t>
             </a:r>
             <a:r>
@@ -8564,7 +8509,7 @@
               <a:buNone/>
             </a:pPr>
             <a:r>
-              <a:rPr lang="pt-BR" sz="4000" dirty="0" err="1"/>
+              <a:rPr lang="pt-BR" sz="4000" b="1" dirty="0" err="1"/>
               <a:t>BiConsumer</a:t>
             </a:r>
             <a:r>
@@ -8587,7 +8532,7 @@
               <a:buNone/>
             </a:pPr>
             <a:r>
-              <a:rPr lang="pt-BR" sz="4000" dirty="0" err="1"/>
+              <a:rPr lang="pt-BR" sz="4000" b="1" dirty="0" err="1"/>
               <a:t>Supplier</a:t>
             </a:r>
             <a:r>
@@ -9074,10 +9019,10 @@
               <a:buNone/>
             </a:pPr>
             <a:r>
-              <a:rPr lang="pt-BR" sz="4000" dirty="0" err="1"/>
+              <a:rPr lang="pt-BR" sz="4000" b="1" dirty="0" err="1"/>
               <a:t>Predicate</a:t>
             </a:r>
-            <a:endParaRPr lang="pt-BR" sz="2800" dirty="0"/>
+            <a:endParaRPr lang="pt-BR" sz="2800" b="1" dirty="0"/>
           </a:p>
           <a:p>
             <a:pPr>
@@ -9288,10 +9233,10 @@
               <a:buNone/>
             </a:pPr>
             <a:r>
-              <a:rPr lang="pt-BR" sz="4000" dirty="0" err="1"/>
+              <a:rPr lang="pt-BR" sz="4000" b="1" dirty="0" err="1"/>
               <a:t>Function</a:t>
             </a:r>
-            <a:endParaRPr lang="pt-BR" sz="4000" dirty="0"/>
+            <a:endParaRPr lang="pt-BR" sz="4000" b="1" dirty="0"/>
           </a:p>
           <a:p>
             <a:pPr marL="0" indent="0" algn="ctr">
@@ -9310,10 +9255,10 @@
               <a:buNone/>
             </a:pPr>
             <a:r>
-              <a:rPr lang="pt-BR" sz="4000" dirty="0" err="1"/>
+              <a:rPr lang="pt-BR" sz="4000" b="1" dirty="0" err="1"/>
               <a:t>BiFunction</a:t>
             </a:r>
-            <a:endParaRPr lang="pt-BR" sz="4000" dirty="0"/>
+            <a:endParaRPr lang="pt-BR" sz="4000" b="1" dirty="0"/>
           </a:p>
         </p:txBody>
       </p:sp>
@@ -9770,13 +9715,19 @@
             <p:ph type="title"/>
           </p:nvPr>
         </p:nvSpPr>
-        <p:spPr/>
+        <p:spPr>
+          <a:xfrm>
+            <a:off x="1673133" y="1509628"/>
+            <a:ext cx="8610600" cy="1293028"/>
+          </a:xfrm>
+        </p:spPr>
         <p:txBody>
           <a:bodyPr/>
           <a:lstStyle/>
           <a:p>
-            <a:r>
-              <a:rPr lang="pt-BR" dirty="0"/>
+            <a:pPr algn="ctr"/>
+            <a:r>
+              <a:rPr lang="pt-BR" b="1" dirty="0"/>
               <a:t>Para saber mais</a:t>
             </a:r>
           </a:p>
@@ -9798,13 +9749,23 @@
             <p:ph idx="1"/>
           </p:nvPr>
         </p:nvSpPr>
-        <p:spPr/>
-        <p:txBody>
-          <a:bodyPr/>
+        <p:spPr>
+          <a:xfrm>
+            <a:off x="685800" y="3566160"/>
+            <a:ext cx="10820400" cy="2652525"/>
+          </a:xfrm>
+        </p:spPr>
+        <p:txBody>
+          <a:bodyPr>
+            <a:normAutofit/>
+          </a:bodyPr>
           <a:lstStyle/>
           <a:p>
-            <a:r>
-              <a:rPr lang="pt-BR" b="1" dirty="0">
+            <a:pPr marL="0" indent="0" algn="ctr">
+              <a:buNone/>
+            </a:pPr>
+            <a:r>
+              <a:rPr lang="pt-BR" sz="6000" b="1" dirty="0">
                 <a:solidFill>
                   <a:schemeClr val="bg1"/>
                 </a:solidFill>
@@ -9812,7 +9773,7 @@
               </a:rPr>
               <a:t>https://git.io/Je3Uo</a:t>
             </a:r>
-            <a:endParaRPr lang="pt-BR" dirty="0"/>
+            <a:endParaRPr lang="pt-BR" sz="6000" dirty="0"/>
           </a:p>
         </p:txBody>
       </p:sp>
@@ -10201,7 +10162,15 @@
             <a:pPr algn="ctr"/>
             <a:r>
               <a:rPr lang="pt-BR" dirty="0"/>
-              <a:t>Quais os problemas desta loop?</a:t>
+              <a:t>Quais os problemas </a:t>
+            </a:r>
+            <a:r>
+              <a:rPr lang="pt-BR" dirty="0" err="1"/>
+              <a:t>destE</a:t>
+            </a:r>
+            <a:r>
+              <a:rPr lang="pt-BR" dirty="0"/>
+              <a:t> loop?</a:t>
             </a:r>
           </a:p>
         </p:txBody>
@@ -10486,7 +10455,15 @@
             </a:r>
             <a:r>
               <a:rPr lang="en-US" sz="4400" dirty="0"/>
-              <a:t> loop </a:t>
+              <a:t> </a:t>
+            </a:r>
+            <a:r>
+              <a:rPr lang="en-US" sz="4400" i="1" dirty="0"/>
+              <a:t>loop</a:t>
+            </a:r>
+            <a:r>
+              <a:rPr lang="en-US" sz="4400" dirty="0"/>
+              <a:t> </a:t>
             </a:r>
             <a:r>
               <a:rPr lang="en-US" sz="4400" dirty="0" err="1"/>
@@ -10836,7 +10813,15 @@
             <a:pPr algn="ctr"/>
             <a:r>
               <a:rPr lang="pt-BR" dirty="0"/>
-              <a:t>Como podemos simplificar este loop?</a:t>
+              <a:t>Como podemos simplificar este </a:t>
+            </a:r>
+            <a:r>
+              <a:rPr lang="pt-BR" i="1" dirty="0"/>
+              <a:t>loop</a:t>
+            </a:r>
+            <a:r>
+              <a:rPr lang="pt-BR" dirty="0"/>
+              <a:t>?</a:t>
             </a:r>
           </a:p>
         </p:txBody>
@@ -11059,7 +11044,15 @@
             <a:pPr algn="ctr"/>
             <a:r>
               <a:rPr lang="pt-BR" dirty="0"/>
-              <a:t>o loop aqui não é o que desejamos fazer de fato. </a:t>
+              <a:t>o </a:t>
+            </a:r>
+            <a:r>
+              <a:rPr lang="pt-BR" i="1" dirty="0"/>
+              <a:t>loop</a:t>
+            </a:r>
+            <a:r>
+              <a:rPr lang="pt-BR" dirty="0"/>
+              <a:t> aqui não é o que desejamos fazer de fato. </a:t>
             </a:r>
           </a:p>
         </p:txBody>

</xml_diff>

<commit_message>
Atualiza slides programação funcional Java
</commit_message>
<xml_diff>
--- a/programacao-funcional-java8.pptx
+++ b/programacao-funcional-java8.pptx
@@ -216,7 +216,7 @@
           <a:p>
             <a:fld id="{7497B6E1-7C5B-524D-B5EB-5E6695205380}" type="datetimeFigureOut">
               <a:rPr lang="pt-BR" smtClean="0"/>
-              <a:t>11/11/2021</a:t>
+              <a:t>21/03/2022</a:t>
             </a:fld>
             <a:endParaRPr lang="pt-BR"/>
           </a:p>
@@ -654,7 +654,7 @@
           <a:p>
             <a:fld id="{19E7D63B-43B5-8A4C-BD12-76889BE136BD}" type="datetime1">
               <a:rPr lang="en-US" smtClean="0"/>
-              <a:t>11/11/21</a:t>
+              <a:t>3/21/22</a:t>
             </a:fld>
             <a:endParaRPr lang="en-US" dirty="0"/>
           </a:p>
@@ -921,7 +921,7 @@
           <a:p>
             <a:fld id="{124E9894-F119-A64C-B7CB-D7CE860A73BE}" type="datetime1">
               <a:rPr lang="en-US" smtClean="0"/>
-              <a:t>11/11/21</a:t>
+              <a:t>3/21/22</a:t>
             </a:fld>
             <a:endParaRPr lang="en-US" dirty="0"/>
           </a:p>
@@ -1153,7 +1153,7 @@
           <a:p>
             <a:fld id="{124E9894-F119-A64C-B7CB-D7CE860A73BE}" type="datetime1">
               <a:rPr lang="en-US" smtClean="0"/>
-              <a:t>11/11/21</a:t>
+              <a:t>3/21/22</a:t>
             </a:fld>
             <a:endParaRPr lang="en-US" dirty="0"/>
           </a:p>
@@ -1464,7 +1464,7 @@
           <a:p>
             <a:fld id="{124E9894-F119-A64C-B7CB-D7CE860A73BE}" type="datetime1">
               <a:rPr lang="en-US" smtClean="0"/>
-              <a:t>11/11/21</a:t>
+              <a:t>3/21/22</a:t>
             </a:fld>
             <a:endParaRPr lang="en-US" dirty="0"/>
           </a:p>
@@ -1938,7 +1938,7 @@
           <a:p>
             <a:fld id="{B4BBB50B-BAA3-9748-978F-08A7877AB7D9}" type="datetime1">
               <a:rPr lang="en-US" smtClean="0"/>
-              <a:t>11/11/21</a:t>
+              <a:t>3/21/22</a:t>
             </a:fld>
             <a:endParaRPr lang="en-US" dirty="0"/>
           </a:p>
@@ -2485,7 +2485,7 @@
           <a:p>
             <a:fld id="{124E9894-F119-A64C-B7CB-D7CE860A73BE}" type="datetime1">
               <a:rPr lang="en-US" smtClean="0"/>
-              <a:t>11/11/21</a:t>
+              <a:t>3/21/22</a:t>
             </a:fld>
             <a:endParaRPr lang="en-US" dirty="0"/>
           </a:p>
@@ -3260,7 +3260,7 @@
           <a:p>
             <a:fld id="{124E9894-F119-A64C-B7CB-D7CE860A73BE}" type="datetime1">
               <a:rPr lang="en-US" smtClean="0"/>
-              <a:t>11/11/21</a:t>
+              <a:t>3/21/22</a:t>
             </a:fld>
             <a:endParaRPr lang="en-US" dirty="0"/>
           </a:p>
@@ -3436,7 +3436,7 @@
           <a:p>
             <a:fld id="{45040DEA-CE02-EF42-8F10-34F709D8505D}" type="datetime1">
               <a:rPr lang="en-US" smtClean="0"/>
-              <a:t>11/11/21</a:t>
+              <a:t>3/21/22</a:t>
             </a:fld>
             <a:endParaRPr lang="en-US" dirty="0"/>
           </a:p>
@@ -3659,7 +3659,7 @@
           <a:p>
             <a:fld id="{A0C1C801-5706-434E-AB65-DDFBCF1F55D2}" type="datetime1">
               <a:rPr lang="en-US" smtClean="0"/>
-              <a:t>11/11/21</a:t>
+              <a:t>3/21/22</a:t>
             </a:fld>
             <a:endParaRPr lang="en-US" dirty="0"/>
           </a:p>
@@ -3839,7 +3839,7 @@
           <a:p>
             <a:fld id="{39AE0FD8-7D7B-EA4F-8AF8-8B97820A0C5D}" type="datetime1">
               <a:rPr lang="en-US" smtClean="0"/>
-              <a:t>11/11/21</a:t>
+              <a:t>3/21/22</a:t>
             </a:fld>
             <a:endParaRPr lang="en-US" dirty="0"/>
           </a:p>
@@ -4128,7 +4128,7 @@
           <a:p>
             <a:fld id="{7FC94D43-3F68-DC43-8EF0-95FB3D51CCCF}" type="datetime1">
               <a:rPr lang="en-US" smtClean="0"/>
-              <a:t>11/11/21</a:t>
+              <a:t>3/21/22</a:t>
             </a:fld>
             <a:endParaRPr lang="en-US" dirty="0"/>
           </a:p>
@@ -4370,7 +4370,7 @@
           <a:p>
             <a:fld id="{BD42CFC2-1CE8-9045-8C9C-0F183F0FB455}" type="datetime1">
               <a:rPr lang="en-US" smtClean="0"/>
-              <a:t>11/11/21</a:t>
+              <a:t>3/21/22</a:t>
             </a:fld>
             <a:endParaRPr lang="en-US" dirty="0"/>
           </a:p>
@@ -4749,7 +4749,7 @@
           <a:p>
             <a:fld id="{F1B5C6E2-D044-C748-9C41-86C9B2F84EB9}" type="datetime1">
               <a:rPr lang="en-US" smtClean="0"/>
-              <a:t>11/11/21</a:t>
+              <a:t>3/21/22</a:t>
             </a:fld>
             <a:endParaRPr lang="en-US" dirty="0"/>
           </a:p>
@@ -4867,7 +4867,7 @@
           <a:p>
             <a:fld id="{359C32BA-C166-AC45-9FCD-8BF0F43629D9}" type="datetime1">
               <a:rPr lang="en-US" smtClean="0"/>
-              <a:t>11/11/21</a:t>
+              <a:t>3/21/22</a:t>
             </a:fld>
             <a:endParaRPr lang="en-US" dirty="0"/>
           </a:p>
@@ -4962,7 +4962,7 @@
           <a:p>
             <a:fld id="{E5D0D591-4B92-A44B-A0EA-798E76AD0368}" type="datetime1">
               <a:rPr lang="en-US" smtClean="0"/>
-              <a:t>11/11/21</a:t>
+              <a:t>3/21/22</a:t>
             </a:fld>
             <a:endParaRPr lang="en-US" dirty="0"/>
           </a:p>
@@ -5211,7 +5211,7 @@
           <a:p>
             <a:fld id="{8201F472-E17F-4B47-A44B-A2249FA27ED2}" type="datetime1">
               <a:rPr lang="en-US" smtClean="0"/>
-              <a:t>11/11/21</a:t>
+              <a:t>3/21/22</a:t>
             </a:fld>
             <a:endParaRPr lang="en-US" dirty="0"/>
           </a:p>
@@ -5468,7 +5468,7 @@
           <a:p>
             <a:fld id="{8BEFB9EE-CDF2-6F49-80F4-278D1604F10C}" type="datetime1">
               <a:rPr lang="en-US" smtClean="0"/>
-              <a:t>11/11/21</a:t>
+              <a:t>3/21/22</a:t>
             </a:fld>
             <a:endParaRPr lang="en-US" dirty="0"/>
           </a:p>
@@ -5714,7 +5714,7 @@
           <a:p>
             <a:fld id="{124E9894-F119-A64C-B7CB-D7CE860A73BE}" type="datetime1">
               <a:rPr lang="en-US" smtClean="0"/>
-              <a:t>11/11/21</a:t>
+              <a:t>3/21/22</a:t>
             </a:fld>
             <a:endParaRPr lang="en-US" dirty="0"/>
           </a:p>
@@ -7472,7 +7472,7 @@
           <a:p>
             <a:r>
               <a:rPr lang="pt-BR" b="1" dirty="0"/>
-              <a:t>tópicos</a:t>
+              <a:t>Mãos na massa</a:t>
             </a:r>
           </a:p>
         </p:txBody>

</xml_diff>